<commit_message>
add file folder's sub-folders complete url alert model design in ppt
</commit_message>
<xml_diff>
--- a/doc/sharp-design-doc.pptx
+++ b/doc/sharp-design-doc.pptx
@@ -109,7 +109,7 @@
   </p:defaultTextStyle>
   <p:extLst>
     <p:ext uri="{EFAFB233-063F-42B5-8137-9DF3F51BA10A}">
-      <p15:sldGuideLst xmlns:p15="http://schemas.microsoft.com/office/powerpoint/2012/main" xmlns=""/>
+      <p15:sldGuideLst xmlns="" xmlns:p15="http://schemas.microsoft.com/office/powerpoint/2012/main"/>
     </p:ext>
   </p:extLst>
 </p:presentation>
@@ -246,7 +246,7 @@
           <a:p>
             <a:fld id="{59AAB081-3BCA-4894-8A8D-477C7967B98C}" type="datetimeFigureOut">
               <a:rPr lang="en-US" smtClean="0"/>
-              <a:t>2/26/2015</a:t>
+              <a:t>3/3/2015</a:t>
             </a:fld>
             <a:endParaRPr lang="en-US"/>
           </a:p>
@@ -416,7 +416,7 @@
           <a:p>
             <a:fld id="{59AAB081-3BCA-4894-8A8D-477C7967B98C}" type="datetimeFigureOut">
               <a:rPr lang="en-US" smtClean="0"/>
-              <a:t>2/26/2015</a:t>
+              <a:t>3/3/2015</a:t>
             </a:fld>
             <a:endParaRPr lang="en-US"/>
           </a:p>
@@ -596,7 +596,7 @@
           <a:p>
             <a:fld id="{59AAB081-3BCA-4894-8A8D-477C7967B98C}" type="datetimeFigureOut">
               <a:rPr lang="en-US" smtClean="0"/>
-              <a:t>2/26/2015</a:t>
+              <a:t>3/3/2015</a:t>
             </a:fld>
             <a:endParaRPr lang="en-US"/>
           </a:p>
@@ -766,7 +766,7 @@
           <a:p>
             <a:fld id="{59AAB081-3BCA-4894-8A8D-477C7967B98C}" type="datetimeFigureOut">
               <a:rPr lang="en-US" smtClean="0"/>
-              <a:t>2/26/2015</a:t>
+              <a:t>3/3/2015</a:t>
             </a:fld>
             <a:endParaRPr lang="en-US"/>
           </a:p>
@@ -1012,7 +1012,7 @@
           <a:p>
             <a:fld id="{59AAB081-3BCA-4894-8A8D-477C7967B98C}" type="datetimeFigureOut">
               <a:rPr lang="en-US" smtClean="0"/>
-              <a:t>2/26/2015</a:t>
+              <a:t>3/3/2015</a:t>
             </a:fld>
             <a:endParaRPr lang="en-US"/>
           </a:p>
@@ -1244,7 +1244,7 @@
           <a:p>
             <a:fld id="{59AAB081-3BCA-4894-8A8D-477C7967B98C}" type="datetimeFigureOut">
               <a:rPr lang="en-US" smtClean="0"/>
-              <a:t>2/26/2015</a:t>
+              <a:t>3/3/2015</a:t>
             </a:fld>
             <a:endParaRPr lang="en-US"/>
           </a:p>
@@ -1611,7 +1611,7 @@
           <a:p>
             <a:fld id="{59AAB081-3BCA-4894-8A8D-477C7967B98C}" type="datetimeFigureOut">
               <a:rPr lang="en-US" smtClean="0"/>
-              <a:t>2/26/2015</a:t>
+              <a:t>3/3/2015</a:t>
             </a:fld>
             <a:endParaRPr lang="en-US"/>
           </a:p>
@@ -1729,7 +1729,7 @@
           <a:p>
             <a:fld id="{59AAB081-3BCA-4894-8A8D-477C7967B98C}" type="datetimeFigureOut">
               <a:rPr lang="en-US" smtClean="0"/>
-              <a:t>2/26/2015</a:t>
+              <a:t>3/3/2015</a:t>
             </a:fld>
             <a:endParaRPr lang="en-US"/>
           </a:p>
@@ -1824,7 +1824,7 @@
           <a:p>
             <a:fld id="{59AAB081-3BCA-4894-8A8D-477C7967B98C}" type="datetimeFigureOut">
               <a:rPr lang="en-US" smtClean="0"/>
-              <a:t>2/26/2015</a:t>
+              <a:t>3/3/2015</a:t>
             </a:fld>
             <a:endParaRPr lang="en-US"/>
           </a:p>
@@ -2101,7 +2101,7 @@
           <a:p>
             <a:fld id="{59AAB081-3BCA-4894-8A8D-477C7967B98C}" type="datetimeFigureOut">
               <a:rPr lang="en-US" smtClean="0"/>
-              <a:t>2/26/2015</a:t>
+              <a:t>3/3/2015</a:t>
             </a:fld>
             <a:endParaRPr lang="en-US"/>
           </a:p>
@@ -2354,7 +2354,7 @@
           <a:p>
             <a:fld id="{59AAB081-3BCA-4894-8A8D-477C7967B98C}" type="datetimeFigureOut">
               <a:rPr lang="en-US" smtClean="0"/>
-              <a:t>2/26/2015</a:t>
+              <a:t>3/3/2015</a:t>
             </a:fld>
             <a:endParaRPr lang="en-US"/>
           </a:p>
@@ -2567,7 +2567,7 @@
           <a:p>
             <a:fld id="{59AAB081-3BCA-4894-8A8D-477C7967B98C}" type="datetimeFigureOut">
               <a:rPr lang="en-US" smtClean="0"/>
-              <a:t>2/26/2015</a:t>
+              <a:t>3/3/2015</a:t>
             </a:fld>
             <a:endParaRPr lang="en-US"/>
           </a:p>
@@ -5539,7 +5539,7 @@
         <p:spPr>
           <a:xfrm>
             <a:off x="3451835" y="372888"/>
-            <a:ext cx="4634074" cy="523220"/>
+            <a:ext cx="5195776" cy="523220"/>
           </a:xfrm>
           <a:prstGeom prst="rect">
             <a:avLst/>
@@ -5558,7 +5558,11 @@
             <a:pPr algn="ctr"/>
             <a:r>
               <a:rPr lang="en-US" sz="2800" dirty="0" smtClean="0"/>
-              <a:t>URL Alert Detection Model</a:t>
+              <a:t>Web URL </a:t>
+            </a:r>
+            <a:r>
+              <a:rPr lang="en-US" sz="2800" dirty="0" smtClean="0"/>
+              <a:t>Alert Detection Model</a:t>
             </a:r>
             <a:endParaRPr lang="en-US" sz="2800" dirty="0"/>
           </a:p>
@@ -5572,7 +5576,7 @@
         </p:nvSpPr>
         <p:spPr>
           <a:xfrm>
-            <a:off x="241588" y="1367023"/>
+            <a:off x="633478" y="1367023"/>
             <a:ext cx="1371600" cy="369332"/>
           </a:xfrm>
           <a:prstGeom prst="rect">
@@ -5608,7 +5612,7 @@
         </p:nvGrpSpPr>
         <p:grpSpPr>
           <a:xfrm>
-            <a:off x="316674" y="2593920"/>
+            <a:off x="708564" y="2593920"/>
             <a:ext cx="1231199" cy="675476"/>
             <a:chOff x="3373457" y="2743200"/>
             <a:chExt cx="1231199" cy="675476"/>
@@ -5700,7 +5704,7 @@
         </p:nvGrpSpPr>
         <p:grpSpPr>
           <a:xfrm>
-            <a:off x="2485655" y="2632546"/>
+            <a:off x="2838356" y="2632546"/>
             <a:ext cx="1231199" cy="675476"/>
             <a:chOff x="3373457" y="2743200"/>
             <a:chExt cx="1231199" cy="675476"/>
@@ -5792,7 +5796,7 @@
         </p:nvSpPr>
         <p:spPr>
           <a:xfrm>
-            <a:off x="2405658" y="1374727"/>
+            <a:off x="2758359" y="1374727"/>
             <a:ext cx="1371600" cy="369332"/>
           </a:xfrm>
           <a:prstGeom prst="rect">
@@ -5828,7 +5832,7 @@
         </p:nvSpPr>
         <p:spPr>
           <a:xfrm>
-            <a:off x="4635915" y="1403003"/>
+            <a:off x="4988616" y="1403003"/>
             <a:ext cx="1371600" cy="369332"/>
           </a:xfrm>
           <a:prstGeom prst="rect">
@@ -5867,8 +5871,8 @@
         </p:nvCxnSpPr>
         <p:spPr>
           <a:xfrm flipV="1">
-            <a:off x="1547873" y="1559393"/>
-            <a:ext cx="857785" cy="1372265"/>
+            <a:off x="1939763" y="1559393"/>
+            <a:ext cx="818596" cy="1372265"/>
           </a:xfrm>
           <a:prstGeom prst="straightConnector1">
             <a:avLst/>
@@ -5900,7 +5904,7 @@
         </p:nvSpPr>
         <p:spPr>
           <a:xfrm>
-            <a:off x="350241" y="1994370"/>
+            <a:off x="742131" y="1994370"/>
             <a:ext cx="591830" cy="369332"/>
           </a:xfrm>
           <a:prstGeom prst="rect">
@@ -5934,7 +5938,7 @@
         </p:nvCxnSpPr>
         <p:spPr>
           <a:xfrm>
-            <a:off x="927388" y="1736355"/>
+            <a:off x="1319278" y="1736355"/>
             <a:ext cx="4886" cy="857565"/>
           </a:xfrm>
           <a:prstGeom prst="straightConnector1">
@@ -5967,7 +5971,7 @@
         </p:nvSpPr>
         <p:spPr>
           <a:xfrm>
-            <a:off x="1096894" y="2071237"/>
+            <a:off x="1488784" y="2071237"/>
             <a:ext cx="848502" cy="369332"/>
           </a:xfrm>
           <a:prstGeom prst="rect">
@@ -6001,7 +6005,7 @@
         </p:nvCxnSpPr>
         <p:spPr>
           <a:xfrm>
-            <a:off x="3091458" y="1744059"/>
+            <a:off x="3444159" y="1744059"/>
             <a:ext cx="9797" cy="888487"/>
           </a:xfrm>
           <a:prstGeom prst="straightConnector1">
@@ -6034,7 +6038,7 @@
         </p:nvSpPr>
         <p:spPr>
           <a:xfrm>
-            <a:off x="2475858" y="2001293"/>
+            <a:off x="2828559" y="2001293"/>
             <a:ext cx="591830" cy="369332"/>
           </a:xfrm>
           <a:prstGeom prst="rect">
@@ -6067,7 +6071,7 @@
         </p:nvCxnSpPr>
         <p:spPr>
           <a:xfrm flipV="1">
-            <a:off x="3716854" y="1587669"/>
+            <a:off x="4069555" y="1587669"/>
             <a:ext cx="919061" cy="1322371"/>
           </a:xfrm>
           <a:prstGeom prst="straightConnector1">
@@ -6100,7 +6104,7 @@
         </p:nvSpPr>
         <p:spPr>
           <a:xfrm>
-            <a:off x="3437030" y="2019660"/>
+            <a:off x="3789731" y="2019660"/>
             <a:ext cx="773353" cy="369332"/>
           </a:xfrm>
           <a:prstGeom prst="rect">
@@ -6123,215 +6127,208 @@
           </a:p>
         </p:txBody>
       </p:sp>
-      <p:grpSp>
-        <p:nvGrpSpPr>
-          <p:cNvPr id="16" name="Group 15"/>
-          <p:cNvGrpSpPr/>
+      <p:sp>
+        <p:nvSpPr>
+          <p:cNvPr id="13" name="Rounded Rectangle 12"/>
+          <p:cNvSpPr/>
           <p:nvPr/>
-        </p:nvGrpSpPr>
-        <p:grpSpPr>
-          <a:xfrm>
-            <a:off x="2299561" y="4029890"/>
-            <a:ext cx="3954227" cy="1105819"/>
-            <a:chOff x="4611712" y="3964575"/>
-            <a:chExt cx="3954227" cy="1105819"/>
-          </a:xfrm>
-        </p:grpSpPr>
-        <p:sp>
-          <p:nvSpPr>
-            <p:cNvPr id="13" name="Rounded Rectangle 12"/>
-            <p:cNvSpPr/>
-            <p:nvPr/>
-          </p:nvSpPr>
-          <p:spPr>
-            <a:xfrm>
-              <a:off x="4611712" y="3990702"/>
-              <a:ext cx="1606731" cy="770709"/>
-            </a:xfrm>
-            <a:prstGeom prst="roundRect">
-              <a:avLst/>
-            </a:prstGeom>
+        </p:nvSpPr>
+        <p:spPr>
+          <a:xfrm>
+            <a:off x="2652262" y="4056017"/>
+            <a:ext cx="1606731" cy="770709"/>
+          </a:xfrm>
+          <a:prstGeom prst="roundRect">
+            <a:avLst/>
+          </a:prstGeom>
+          <a:solidFill>
+            <a:schemeClr val="bg1"/>
+          </a:solidFill>
+        </p:spPr>
+        <p:style>
+          <a:lnRef idx="2">
+            <a:schemeClr val="accent1">
+              <a:shade val="50000"/>
+            </a:schemeClr>
+          </a:lnRef>
+          <a:fillRef idx="1">
+            <a:schemeClr val="accent1"/>
+          </a:fillRef>
+          <a:effectRef idx="0">
+            <a:schemeClr val="accent1"/>
+          </a:effectRef>
+          <a:fontRef idx="minor">
+            <a:schemeClr val="lt1"/>
+          </a:fontRef>
+        </p:style>
+        <p:txBody>
+          <a:bodyPr rtlCol="0" anchor="ctr"/>
+          <a:lstStyle/>
+          <a:p>
+            <a:pPr algn="ctr"/>
+            <a:endParaRPr lang="en-US"/>
+          </a:p>
+        </p:txBody>
+      </p:sp>
+      <p:sp>
+        <p:nvSpPr>
+          <p:cNvPr id="46" name="TextBox 45"/>
+          <p:cNvSpPr txBox="1"/>
+          <p:nvPr/>
+        </p:nvSpPr>
+        <p:spPr>
+          <a:xfrm>
+            <a:off x="2882100" y="4254918"/>
+            <a:ext cx="1200971" cy="369332"/>
+          </a:xfrm>
+          <a:prstGeom prst="rect">
+            <a:avLst/>
+          </a:prstGeom>
+          <a:noFill/>
+        </p:spPr>
+        <p:txBody>
+          <a:bodyPr wrap="none" rtlCol="0">
+            <a:spAutoFit/>
+          </a:bodyPr>
+          <a:lstStyle/>
+          <a:p>
+            <a:pPr algn="ctr"/>
+            <a:r>
+              <a:rPr lang="en-US" dirty="0" smtClean="0"/>
+              <a:t>Alert Rules</a:t>
+            </a:r>
+            <a:endParaRPr lang="en-US" dirty="0"/>
+          </a:p>
+        </p:txBody>
+      </p:sp>
+      <p:sp>
+        <p:nvSpPr>
+          <p:cNvPr id="47" name="TextBox 46"/>
+          <p:cNvSpPr txBox="1"/>
+          <p:nvPr/>
+        </p:nvSpPr>
+        <p:spPr>
+          <a:xfrm>
+            <a:off x="4267008" y="4029890"/>
+            <a:ext cx="2242344" cy="369332"/>
+          </a:xfrm>
+          <a:prstGeom prst="rect">
+            <a:avLst/>
+          </a:prstGeom>
+          <a:noFill/>
+          <a:ln>
             <a:solidFill>
-              <a:schemeClr val="bg1"/>
+              <a:schemeClr val="accent1"/>
             </a:solidFill>
-          </p:spPr>
-          <p:style>
-            <a:lnRef idx="2">
-              <a:schemeClr val="accent1">
-                <a:shade val="50000"/>
-              </a:schemeClr>
-            </a:lnRef>
-            <a:fillRef idx="1">
+          </a:ln>
+        </p:spPr>
+        <p:txBody>
+          <a:bodyPr wrap="none" rtlCol="0">
+            <a:spAutoFit/>
+          </a:bodyPr>
+          <a:lstStyle/>
+          <a:p>
+            <a:pPr algn="ctr"/>
+            <a:r>
+              <a:rPr lang="en-US" dirty="0" smtClean="0"/>
+              <a:t>sensitive </a:t>
+            </a:r>
+            <a:r>
+              <a:rPr lang="en-US" dirty="0" err="1" smtClean="0"/>
+              <a:t>param</a:t>
+            </a:r>
+            <a:r>
+              <a:rPr lang="en-US" dirty="0" smtClean="0"/>
+              <a:t> </a:t>
+            </a:r>
+            <a:r>
+              <a:rPr lang="en-US" dirty="0" smtClean="0"/>
+              <a:t>name</a:t>
+            </a:r>
+            <a:endParaRPr lang="en-US" dirty="0"/>
+          </a:p>
+        </p:txBody>
+      </p:sp>
+      <p:sp>
+        <p:nvSpPr>
+          <p:cNvPr id="48" name="TextBox 47"/>
+          <p:cNvSpPr txBox="1"/>
+          <p:nvPr/>
+        </p:nvSpPr>
+        <p:spPr>
+          <a:xfrm>
+            <a:off x="4269692" y="4404969"/>
+            <a:ext cx="1009058" cy="369332"/>
+          </a:xfrm>
+          <a:prstGeom prst="rect">
+            <a:avLst/>
+          </a:prstGeom>
+          <a:noFill/>
+          <a:ln>
+            <a:solidFill>
               <a:schemeClr val="accent1"/>
-            </a:fillRef>
-            <a:effectRef idx="0">
+            </a:solidFill>
+          </a:ln>
+        </p:spPr>
+        <p:txBody>
+          <a:bodyPr wrap="none" rtlCol="0">
+            <a:spAutoFit/>
+          </a:bodyPr>
+          <a:lstStyle/>
+          <a:p>
+            <a:pPr algn="ctr"/>
+            <a:r>
+              <a:rPr lang="en-US" dirty="0" smtClean="0"/>
+              <a:t>new </a:t>
+            </a:r>
+            <a:r>
+              <a:rPr lang="en-US" dirty="0" smtClean="0"/>
+              <a:t>URL</a:t>
+            </a:r>
+            <a:endParaRPr lang="en-US" dirty="0"/>
+          </a:p>
+        </p:txBody>
+      </p:sp>
+      <p:sp>
+        <p:nvSpPr>
+          <p:cNvPr id="49" name="TextBox 48"/>
+          <p:cNvSpPr txBox="1"/>
+          <p:nvPr/>
+        </p:nvSpPr>
+        <p:spPr>
+          <a:xfrm>
+            <a:off x="4266654" y="4766377"/>
+            <a:ext cx="1241558" cy="369332"/>
+          </a:xfrm>
+          <a:prstGeom prst="rect">
+            <a:avLst/>
+          </a:prstGeom>
+          <a:noFill/>
+          <a:ln>
+            <a:solidFill>
               <a:schemeClr val="accent1"/>
-            </a:effectRef>
-            <a:fontRef idx="minor">
-              <a:schemeClr val="lt1"/>
-            </a:fontRef>
-          </p:style>
-          <p:txBody>
-            <a:bodyPr rtlCol="0" anchor="ctr"/>
-            <a:lstStyle/>
-            <a:p>
-              <a:pPr algn="ctr"/>
-              <a:endParaRPr lang="en-US"/>
-            </a:p>
-          </p:txBody>
-        </p:sp>
-        <p:sp>
-          <p:nvSpPr>
-            <p:cNvPr id="46" name="TextBox 45"/>
-            <p:cNvSpPr txBox="1"/>
-            <p:nvPr/>
-          </p:nvSpPr>
-          <p:spPr>
-            <a:xfrm>
-              <a:off x="4841550" y="4189603"/>
-              <a:ext cx="1200971" cy="369332"/>
-            </a:xfrm>
-            <a:prstGeom prst="rect">
-              <a:avLst/>
-            </a:prstGeom>
-            <a:noFill/>
-          </p:spPr>
-          <p:txBody>
-            <a:bodyPr wrap="none" rtlCol="0">
-              <a:spAutoFit/>
-            </a:bodyPr>
-            <a:lstStyle/>
-            <a:p>
-              <a:pPr algn="ctr"/>
-              <a:r>
-                <a:rPr lang="en-US" dirty="0" smtClean="0"/>
-                <a:t>Alert Rules</a:t>
-              </a:r>
-              <a:endParaRPr lang="en-US" dirty="0"/>
-            </a:p>
-          </p:txBody>
-        </p:sp>
-        <p:sp>
-          <p:nvSpPr>
-            <p:cNvPr id="47" name="TextBox 46"/>
-            <p:cNvSpPr txBox="1"/>
-            <p:nvPr/>
-          </p:nvSpPr>
-          <p:spPr>
-            <a:xfrm>
-              <a:off x="6233826" y="3964575"/>
-              <a:ext cx="2332113" cy="369332"/>
-            </a:xfrm>
-            <a:prstGeom prst="rect">
-              <a:avLst/>
-            </a:prstGeom>
-            <a:noFill/>
-            <a:ln>
-              <a:solidFill>
-                <a:schemeClr val="accent1"/>
-              </a:solidFill>
-            </a:ln>
-          </p:spPr>
-          <p:txBody>
-            <a:bodyPr wrap="none" rtlCol="0">
-              <a:spAutoFit/>
-            </a:bodyPr>
-            <a:lstStyle/>
-            <a:p>
-              <a:pPr algn="ctr"/>
-              <a:r>
-                <a:rPr lang="en-US" dirty="0" smtClean="0"/>
-                <a:t>sensitive </a:t>
-              </a:r>
-              <a:r>
-                <a:rPr lang="en-US" dirty="0" err="1" smtClean="0"/>
-                <a:t>param</a:t>
-              </a:r>
-              <a:r>
-                <a:rPr lang="en-US" dirty="0" smtClean="0"/>
-                <a:t> names</a:t>
-              </a:r>
-              <a:endParaRPr lang="en-US" dirty="0"/>
-            </a:p>
-          </p:txBody>
-        </p:sp>
-        <p:sp>
-          <p:nvSpPr>
-            <p:cNvPr id="48" name="TextBox 47"/>
-            <p:cNvSpPr txBox="1"/>
-            <p:nvPr/>
-          </p:nvSpPr>
-          <p:spPr>
-            <a:xfrm>
-              <a:off x="6236510" y="4339654"/>
-              <a:ext cx="1098827" cy="369332"/>
-            </a:xfrm>
-            <a:prstGeom prst="rect">
-              <a:avLst/>
-            </a:prstGeom>
-            <a:noFill/>
-            <a:ln>
-              <a:solidFill>
-                <a:schemeClr val="accent1"/>
-              </a:solidFill>
-            </a:ln>
-          </p:spPr>
-          <p:txBody>
-            <a:bodyPr wrap="none" rtlCol="0">
-              <a:spAutoFit/>
-            </a:bodyPr>
-            <a:lstStyle/>
-            <a:p>
-              <a:pPr algn="ctr"/>
-              <a:r>
-                <a:rPr lang="en-US" dirty="0" smtClean="0"/>
-                <a:t>new URLs</a:t>
-              </a:r>
-              <a:endParaRPr lang="en-US" dirty="0"/>
-            </a:p>
-          </p:txBody>
-        </p:sp>
-        <p:sp>
-          <p:nvSpPr>
-            <p:cNvPr id="49" name="TextBox 48"/>
-            <p:cNvSpPr txBox="1"/>
-            <p:nvPr/>
-          </p:nvSpPr>
-          <p:spPr>
-            <a:xfrm>
-              <a:off x="6233472" y="4701062"/>
-              <a:ext cx="1331326" cy="369332"/>
-            </a:xfrm>
-            <a:prstGeom prst="rect">
-              <a:avLst/>
-            </a:prstGeom>
-            <a:noFill/>
-            <a:ln>
-              <a:solidFill>
-                <a:schemeClr val="accent1"/>
-              </a:solidFill>
-            </a:ln>
-          </p:spPr>
-          <p:txBody>
-            <a:bodyPr wrap="none" rtlCol="0">
-              <a:spAutoFit/>
-            </a:bodyPr>
-            <a:lstStyle/>
-            <a:p>
-              <a:pPr algn="ctr"/>
-              <a:r>
-                <a:rPr lang="en-US" dirty="0" smtClean="0"/>
-                <a:t>new </a:t>
-              </a:r>
-              <a:r>
-                <a:rPr lang="en-US" dirty="0" err="1" smtClean="0"/>
-                <a:t>params</a:t>
-              </a:r>
-              <a:endParaRPr lang="en-US" dirty="0"/>
-            </a:p>
-          </p:txBody>
-        </p:sp>
-      </p:grpSp>
+            </a:solidFill>
+          </a:ln>
+        </p:spPr>
+        <p:txBody>
+          <a:bodyPr wrap="none" rtlCol="0">
+            <a:spAutoFit/>
+          </a:bodyPr>
+          <a:lstStyle/>
+          <a:p>
+            <a:pPr algn="ctr"/>
+            <a:r>
+              <a:rPr lang="en-US" dirty="0" smtClean="0"/>
+              <a:t>new </a:t>
+            </a:r>
+            <a:r>
+              <a:rPr lang="en-US" dirty="0" err="1" smtClean="0"/>
+              <a:t>param</a:t>
+            </a:r>
+            <a:endParaRPr lang="en-US" dirty="0"/>
+          </a:p>
+        </p:txBody>
+      </p:sp>
       <p:cxnSp>
         <p:nvCxnSpPr>
           <p:cNvPr id="28" name="Straight Arrow Connector 27"/>
@@ -6343,7 +6340,7 @@
         </p:nvCxnSpPr>
         <p:spPr>
           <a:xfrm flipH="1" flipV="1">
-            <a:off x="3101255" y="3308022"/>
+            <a:off x="3453956" y="3308022"/>
             <a:ext cx="1672" cy="747995"/>
           </a:xfrm>
           <a:prstGeom prst="straightConnector1">
@@ -6376,7 +6373,7 @@
         </p:nvSpPr>
         <p:spPr>
           <a:xfrm>
-            <a:off x="2320176" y="3478125"/>
+            <a:off x="2672877" y="3478125"/>
             <a:ext cx="721672" cy="369332"/>
           </a:xfrm>
           <a:prstGeom prst="rect">
@@ -6401,14 +6398,160 @@
       </p:sp>
       <p:sp>
         <p:nvSpPr>
-          <p:cNvPr id="59" name="TextBox 58"/>
+          <p:cNvPr id="43" name="Rounded Rectangle 42"/>
+          <p:cNvSpPr/>
+          <p:nvPr/>
+        </p:nvSpPr>
+        <p:spPr>
+          <a:xfrm>
+            <a:off x="475878" y="4043173"/>
+            <a:ext cx="1606731" cy="770709"/>
+          </a:xfrm>
+          <a:prstGeom prst="roundRect">
+            <a:avLst/>
+          </a:prstGeom>
+          <a:solidFill>
+            <a:schemeClr val="bg1"/>
+          </a:solidFill>
+        </p:spPr>
+        <p:style>
+          <a:lnRef idx="2">
+            <a:schemeClr val="accent1">
+              <a:shade val="50000"/>
+            </a:schemeClr>
+          </a:lnRef>
+          <a:fillRef idx="1">
+            <a:schemeClr val="accent1"/>
+          </a:fillRef>
+          <a:effectRef idx="0">
+            <a:schemeClr val="accent1"/>
+          </a:effectRef>
+          <a:fontRef idx="minor">
+            <a:schemeClr val="lt1"/>
+          </a:fontRef>
+        </p:style>
+        <p:txBody>
+          <a:bodyPr rtlCol="0" anchor="ctr"/>
+          <a:lstStyle/>
+          <a:p>
+            <a:pPr algn="ctr"/>
+            <a:endParaRPr lang="en-US"/>
+          </a:p>
+        </p:txBody>
+      </p:sp>
+      <p:sp>
+        <p:nvSpPr>
+          <p:cNvPr id="45" name="TextBox 44"/>
           <p:cNvSpPr txBox="1"/>
           <p:nvPr/>
         </p:nvSpPr>
         <p:spPr>
           <a:xfrm>
-            <a:off x="6779626" y="1376573"/>
-            <a:ext cx="5081451" cy="2862322"/>
+            <a:off x="547892" y="4256705"/>
+            <a:ext cx="1444883" cy="369332"/>
+          </a:xfrm>
+          <a:prstGeom prst="rect">
+            <a:avLst/>
+          </a:prstGeom>
+          <a:noFill/>
+        </p:spPr>
+        <p:txBody>
+          <a:bodyPr wrap="none" rtlCol="0">
+            <a:spAutoFit/>
+          </a:bodyPr>
+          <a:lstStyle/>
+          <a:p>
+            <a:pPr algn="ctr"/>
+            <a:r>
+              <a:rPr lang="en-US" dirty="0" smtClean="0"/>
+              <a:t>Model </a:t>
+            </a:r>
+            <a:r>
+              <a:rPr lang="en-US" dirty="0" err="1"/>
+              <a:t>C</a:t>
+            </a:r>
+            <a:r>
+              <a:rPr lang="en-US" dirty="0" err="1" smtClean="0"/>
+              <a:t>onfig</a:t>
+            </a:r>
+            <a:endParaRPr lang="en-US" dirty="0"/>
+          </a:p>
+        </p:txBody>
+      </p:sp>
+      <p:cxnSp>
+        <p:nvCxnSpPr>
+          <p:cNvPr id="50" name="Straight Arrow Connector 49"/>
+          <p:cNvCxnSpPr/>
+          <p:nvPr/>
+        </p:nvCxnSpPr>
+        <p:spPr>
+          <a:xfrm flipH="1" flipV="1">
+            <a:off x="1268030" y="3281895"/>
+            <a:ext cx="1672" cy="747995"/>
+          </a:xfrm>
+          <a:prstGeom prst="straightConnector1">
+            <a:avLst/>
+          </a:prstGeom>
+          <a:ln>
+            <a:tailEnd type="arrow"/>
+          </a:ln>
+        </p:spPr>
+        <p:style>
+          <a:lnRef idx="1">
+            <a:schemeClr val="accent1"/>
+          </a:lnRef>
+          <a:fillRef idx="0">
+            <a:schemeClr val="accent1"/>
+          </a:fillRef>
+          <a:effectRef idx="0">
+            <a:schemeClr val="accent1"/>
+          </a:effectRef>
+          <a:fontRef idx="minor">
+            <a:schemeClr val="tx1"/>
+          </a:fontRef>
+        </p:style>
+      </p:cxnSp>
+      <p:sp>
+        <p:nvSpPr>
+          <p:cNvPr id="51" name="TextBox 50"/>
+          <p:cNvSpPr txBox="1"/>
+          <p:nvPr/>
+        </p:nvSpPr>
+        <p:spPr>
+          <a:xfrm>
+            <a:off x="340487" y="3457865"/>
+            <a:ext cx="960136" cy="369332"/>
+          </a:xfrm>
+          <a:prstGeom prst="rect">
+            <a:avLst/>
+          </a:prstGeom>
+          <a:noFill/>
+        </p:spPr>
+        <p:txBody>
+          <a:bodyPr wrap="none" rtlCol="0">
+            <a:spAutoFit/>
+          </a:bodyPr>
+          <a:lstStyle/>
+          <a:p>
+            <a:pPr algn="ctr"/>
+            <a:r>
+              <a:rPr lang="en-US" dirty="0" smtClean="0"/>
+              <a:t>initialize</a:t>
+            </a:r>
+            <a:endParaRPr lang="en-US" dirty="0"/>
+          </a:p>
+        </p:txBody>
+      </p:sp>
+      <p:sp>
+        <p:nvSpPr>
+          <p:cNvPr id="4" name="TextBox 3"/>
+          <p:cNvSpPr txBox="1"/>
+          <p:nvPr/>
+        </p:nvSpPr>
+        <p:spPr>
+          <a:xfrm>
+            <a:off x="7341335" y="3502652"/>
+            <a:ext cx="3775156" cy="1877437"/>
           </a:xfrm>
           <a:prstGeom prst="rect">
             <a:avLst/>
@@ -6418,123 +6561,388 @@
               <a:lumMod val="95000"/>
             </a:schemeClr>
           </a:solidFill>
+        </p:spPr>
+        <p:txBody>
+          <a:bodyPr wrap="square" rtlCol="0">
+            <a:spAutoFit/>
+          </a:bodyPr>
+          <a:lstStyle/>
+          <a:p>
+            <a:pPr algn="ctr"/>
+            <a:r>
+              <a:rPr lang="en-US" dirty="0" smtClean="0"/>
+              <a:t>Model </a:t>
+            </a:r>
+            <a:r>
+              <a:rPr lang="en-US" dirty="0" err="1" smtClean="0"/>
+              <a:t>Config</a:t>
+            </a:r>
+            <a:r>
+              <a:rPr lang="en-US" dirty="0" smtClean="0"/>
+              <a:t> Format</a:t>
+            </a:r>
+            <a:endParaRPr lang="en-US" dirty="0"/>
+          </a:p>
+          <a:p>
+            <a:r>
+              <a:rPr lang="en-US" sz="1400" dirty="0">
+                <a:latin typeface="Times New Roman" panose="02020603050405020304" pitchFamily="18" charset="0"/>
+                <a:cs typeface="Times New Roman" panose="02020603050405020304" pitchFamily="18" charset="0"/>
+              </a:rPr>
+              <a:t>&lt;</a:t>
+            </a:r>
+            <a:r>
+              <a:rPr lang="en-US" sz="1400" dirty="0" err="1">
+                <a:latin typeface="Times New Roman" panose="02020603050405020304" pitchFamily="18" charset="0"/>
+                <a:cs typeface="Times New Roman" panose="02020603050405020304" pitchFamily="18" charset="0"/>
+              </a:rPr>
+              <a:t>conf</a:t>
+            </a:r>
+            <a:r>
+              <a:rPr lang="en-US" sz="1400" dirty="0">
+                <a:latin typeface="Times New Roman" panose="02020603050405020304" pitchFamily="18" charset="0"/>
+                <a:cs typeface="Times New Roman" panose="02020603050405020304" pitchFamily="18" charset="0"/>
+              </a:rPr>
+              <a:t>&gt;</a:t>
+            </a:r>
+          </a:p>
+          <a:p>
+            <a:r>
+              <a:rPr lang="en-US" sz="1400" dirty="0">
+                <a:latin typeface="Times New Roman" panose="02020603050405020304" pitchFamily="18" charset="0"/>
+                <a:cs typeface="Times New Roman" panose="02020603050405020304" pitchFamily="18" charset="0"/>
+              </a:rPr>
+              <a:t>    &lt;model-name&gt;  (unique)</a:t>
+            </a:r>
+          </a:p>
+          <a:p>
+            <a:r>
+              <a:rPr lang="en-US" sz="1400" dirty="0">
+                <a:latin typeface="Times New Roman" panose="02020603050405020304" pitchFamily="18" charset="0"/>
+                <a:cs typeface="Times New Roman" panose="02020603050405020304" pitchFamily="18" charset="0"/>
+              </a:rPr>
+              <a:t>    &lt;model-location&gt; </a:t>
+            </a:r>
+          </a:p>
+          <a:p>
+            <a:r>
+              <a:rPr lang="en-US" sz="1400" dirty="0">
+                <a:latin typeface="Times New Roman" panose="02020603050405020304" pitchFamily="18" charset="0"/>
+                <a:cs typeface="Times New Roman" panose="02020603050405020304" pitchFamily="18" charset="0"/>
+              </a:rPr>
+              <a:t>    &lt;model-description&gt; (optional)</a:t>
+            </a:r>
+          </a:p>
+          <a:p>
+            <a:r>
+              <a:rPr lang="en-US" sz="1400" dirty="0">
+                <a:latin typeface="Times New Roman" panose="02020603050405020304" pitchFamily="18" charset="0"/>
+                <a:cs typeface="Times New Roman" panose="02020603050405020304" pitchFamily="18" charset="0"/>
+              </a:rPr>
+              <a:t>    &lt;log-type&gt;</a:t>
+            </a:r>
+          </a:p>
+          <a:p>
+            <a:r>
+              <a:rPr lang="en-US" sz="1400" dirty="0">
+                <a:latin typeface="Times New Roman" panose="02020603050405020304" pitchFamily="18" charset="0"/>
+                <a:cs typeface="Times New Roman" panose="02020603050405020304" pitchFamily="18" charset="0"/>
+              </a:rPr>
+              <a:t>    &lt;log-location&gt;   </a:t>
+            </a:r>
+          </a:p>
+          <a:p>
+            <a:r>
+              <a:rPr lang="en-US" sz="1400" dirty="0">
+                <a:latin typeface="Times New Roman" panose="02020603050405020304" pitchFamily="18" charset="0"/>
+                <a:cs typeface="Times New Roman" panose="02020603050405020304" pitchFamily="18" charset="0"/>
+              </a:rPr>
+              <a:t>&lt;/</a:t>
+            </a:r>
+            <a:r>
+              <a:rPr lang="en-US" sz="1400" dirty="0" err="1">
+                <a:latin typeface="Times New Roman" panose="02020603050405020304" pitchFamily="18" charset="0"/>
+                <a:cs typeface="Times New Roman" panose="02020603050405020304" pitchFamily="18" charset="0"/>
+              </a:rPr>
+              <a:t>conf</a:t>
+            </a:r>
+            <a:r>
+              <a:rPr lang="en-US" sz="1400" dirty="0">
+                <a:latin typeface="Times New Roman" panose="02020603050405020304" pitchFamily="18" charset="0"/>
+                <a:cs typeface="Times New Roman" panose="02020603050405020304" pitchFamily="18" charset="0"/>
+              </a:rPr>
+              <a:t>&gt;</a:t>
+            </a:r>
+          </a:p>
+        </p:txBody>
+      </p:sp>
+      <p:sp>
+        <p:nvSpPr>
+          <p:cNvPr id="6" name="TextBox 5"/>
+          <p:cNvSpPr txBox="1"/>
+          <p:nvPr/>
+        </p:nvSpPr>
+        <p:spPr>
+          <a:xfrm>
+            <a:off x="7341335" y="1156289"/>
+            <a:ext cx="3775156" cy="2308324"/>
+          </a:xfrm>
+          <a:prstGeom prst="rect">
+            <a:avLst/>
+          </a:prstGeom>
+          <a:solidFill>
+            <a:schemeClr val="bg1">
+              <a:lumMod val="95000"/>
+            </a:schemeClr>
+          </a:solidFill>
+        </p:spPr>
+        <p:txBody>
+          <a:bodyPr wrap="square" rtlCol="0">
+            <a:spAutoFit/>
+          </a:bodyPr>
+          <a:lstStyle/>
+          <a:p>
+            <a:pPr algn="ctr"/>
+            <a:r>
+              <a:rPr lang="en-US" dirty="0" smtClean="0"/>
+              <a:t>URL Alert </a:t>
+            </a:r>
+            <a:r>
+              <a:rPr lang="en-US" dirty="0"/>
+              <a:t>Model </a:t>
+            </a:r>
+            <a:r>
+              <a:rPr lang="en-US" dirty="0" smtClean="0"/>
+              <a:t>Format</a:t>
+            </a:r>
+            <a:endParaRPr lang="en-US" dirty="0"/>
+          </a:p>
+          <a:p>
+            <a:r>
+              <a:rPr lang="en-US" sz="1400" dirty="0">
+                <a:latin typeface="Times New Roman" panose="02020603050405020304" pitchFamily="18" charset="0"/>
+                <a:cs typeface="Times New Roman" panose="02020603050405020304" pitchFamily="18" charset="0"/>
+              </a:rPr>
+              <a:t>&lt;</a:t>
+            </a:r>
+            <a:r>
+              <a:rPr lang="en-US" sz="1400" dirty="0" smtClean="0">
+                <a:latin typeface="Times New Roman" panose="02020603050405020304" pitchFamily="18" charset="0"/>
+                <a:cs typeface="Times New Roman" panose="02020603050405020304" pitchFamily="18" charset="0"/>
+              </a:rPr>
+              <a:t>model name=&gt;</a:t>
+            </a:r>
+            <a:endParaRPr lang="en-US" sz="1400" dirty="0">
+              <a:latin typeface="Times New Roman" panose="02020603050405020304" pitchFamily="18" charset="0"/>
+              <a:cs typeface="Times New Roman" panose="02020603050405020304" pitchFamily="18" charset="0"/>
+            </a:endParaRPr>
+          </a:p>
+          <a:p>
+            <a:r>
+              <a:rPr lang="en-US" sz="1400" dirty="0">
+                <a:latin typeface="Times New Roman" panose="02020603050405020304" pitchFamily="18" charset="0"/>
+                <a:cs typeface="Times New Roman" panose="02020603050405020304" pitchFamily="18" charset="0"/>
+              </a:rPr>
+              <a:t>    </a:t>
+            </a:r>
+            <a:r>
+              <a:rPr lang="en-US" sz="1400" dirty="0" smtClean="0">
+                <a:latin typeface="Times New Roman" panose="02020603050405020304" pitchFamily="18" charset="0"/>
+                <a:cs typeface="Times New Roman" panose="02020603050405020304" pitchFamily="18" charset="0"/>
+              </a:rPr>
+              <a:t>&lt;</a:t>
+            </a:r>
+            <a:r>
+              <a:rPr lang="en-US" sz="1400" dirty="0" smtClean="0">
+                <a:latin typeface="Times New Roman" panose="02020603050405020304" pitchFamily="18" charset="0"/>
+                <a:cs typeface="Times New Roman" panose="02020603050405020304" pitchFamily="18" charset="0"/>
+              </a:rPr>
+              <a:t>request</a:t>
+            </a:r>
+            <a:r>
+              <a:rPr lang="en-US" sz="1400" dirty="0" smtClean="0">
+                <a:latin typeface="Times New Roman" panose="02020603050405020304" pitchFamily="18" charset="0"/>
+                <a:cs typeface="Times New Roman" panose="02020603050405020304" pitchFamily="18" charset="0"/>
+              </a:rPr>
+              <a:t>&gt;</a:t>
+            </a:r>
+          </a:p>
+          <a:p>
+            <a:r>
+              <a:rPr lang="en-US" sz="1400" dirty="0">
+                <a:latin typeface="Times New Roman" panose="02020603050405020304" pitchFamily="18" charset="0"/>
+                <a:cs typeface="Times New Roman" panose="02020603050405020304" pitchFamily="18" charset="0"/>
+              </a:rPr>
+              <a:t> </a:t>
+            </a:r>
+            <a:r>
+              <a:rPr lang="en-US" sz="1400" dirty="0" smtClean="0">
+                <a:latin typeface="Times New Roman" panose="02020603050405020304" pitchFamily="18" charset="0"/>
+                <a:cs typeface="Times New Roman" panose="02020603050405020304" pitchFamily="18" charset="0"/>
+              </a:rPr>
+              <a:t>       &lt;method&gt;&lt;/method&gt;</a:t>
+            </a:r>
+            <a:endParaRPr lang="en-US" sz="1400" dirty="0">
+              <a:latin typeface="Times New Roman" panose="02020603050405020304" pitchFamily="18" charset="0"/>
+              <a:cs typeface="Times New Roman" panose="02020603050405020304" pitchFamily="18" charset="0"/>
+            </a:endParaRPr>
+          </a:p>
+          <a:p>
+            <a:r>
+              <a:rPr lang="en-US" sz="1400" dirty="0">
+                <a:latin typeface="Times New Roman" panose="02020603050405020304" pitchFamily="18" charset="0"/>
+                <a:cs typeface="Times New Roman" panose="02020603050405020304" pitchFamily="18" charset="0"/>
+              </a:rPr>
+              <a:t>        &lt;path&gt; &lt;/path&gt;</a:t>
+            </a:r>
+          </a:p>
+          <a:p>
+            <a:r>
+              <a:rPr lang="en-US" sz="1400" dirty="0">
+                <a:latin typeface="Times New Roman" panose="02020603050405020304" pitchFamily="18" charset="0"/>
+                <a:cs typeface="Times New Roman" panose="02020603050405020304" pitchFamily="18" charset="0"/>
+              </a:rPr>
+              <a:t>        &lt;</a:t>
+            </a:r>
+            <a:r>
+              <a:rPr lang="en-US" sz="1400" dirty="0" err="1">
+                <a:latin typeface="Times New Roman" panose="02020603050405020304" pitchFamily="18" charset="0"/>
+                <a:cs typeface="Times New Roman" panose="02020603050405020304" pitchFamily="18" charset="0"/>
+              </a:rPr>
+              <a:t>params</a:t>
+            </a:r>
+            <a:r>
+              <a:rPr lang="en-US" sz="1400" dirty="0">
+                <a:latin typeface="Times New Roman" panose="02020603050405020304" pitchFamily="18" charset="0"/>
+                <a:cs typeface="Times New Roman" panose="02020603050405020304" pitchFamily="18" charset="0"/>
+              </a:rPr>
+              <a:t> first-seen=    last-seen=   &gt;</a:t>
+            </a:r>
+          </a:p>
+          <a:p>
+            <a:r>
+              <a:rPr lang="en-US" sz="1400" dirty="0">
+                <a:latin typeface="Times New Roman" panose="02020603050405020304" pitchFamily="18" charset="0"/>
+                <a:cs typeface="Times New Roman" panose="02020603050405020304" pitchFamily="18" charset="0"/>
+              </a:rPr>
+              <a:t>	param-name-1, …, </a:t>
+            </a:r>
+            <a:r>
+              <a:rPr lang="en-US" sz="1400" dirty="0" err="1">
+                <a:latin typeface="Times New Roman" panose="02020603050405020304" pitchFamily="18" charset="0"/>
+                <a:cs typeface="Times New Roman" panose="02020603050405020304" pitchFamily="18" charset="0"/>
+              </a:rPr>
+              <a:t>param</a:t>
+            </a:r>
+            <a:r>
+              <a:rPr lang="en-US" sz="1400" dirty="0">
+                <a:latin typeface="Times New Roman" panose="02020603050405020304" pitchFamily="18" charset="0"/>
+                <a:cs typeface="Times New Roman" panose="02020603050405020304" pitchFamily="18" charset="0"/>
+              </a:rPr>
+              <a:t>-name-n</a:t>
+            </a:r>
+          </a:p>
+          <a:p>
+            <a:r>
+              <a:rPr lang="en-US" sz="1400" dirty="0">
+                <a:latin typeface="Times New Roman" panose="02020603050405020304" pitchFamily="18" charset="0"/>
+                <a:cs typeface="Times New Roman" panose="02020603050405020304" pitchFamily="18" charset="0"/>
+              </a:rPr>
+              <a:t>         &lt;/</a:t>
+            </a:r>
+            <a:r>
+              <a:rPr lang="en-US" sz="1400" dirty="0" err="1">
+                <a:latin typeface="Times New Roman" panose="02020603050405020304" pitchFamily="18" charset="0"/>
+                <a:cs typeface="Times New Roman" panose="02020603050405020304" pitchFamily="18" charset="0"/>
+              </a:rPr>
+              <a:t>params</a:t>
+            </a:r>
+            <a:r>
+              <a:rPr lang="en-US" sz="1400" dirty="0">
+                <a:latin typeface="Times New Roman" panose="02020603050405020304" pitchFamily="18" charset="0"/>
+                <a:cs typeface="Times New Roman" panose="02020603050405020304" pitchFamily="18" charset="0"/>
+              </a:rPr>
+              <a:t>&gt;</a:t>
+            </a:r>
+          </a:p>
+          <a:p>
+            <a:r>
+              <a:rPr lang="en-US" sz="1400" dirty="0">
+                <a:latin typeface="Times New Roman" panose="02020603050405020304" pitchFamily="18" charset="0"/>
+                <a:cs typeface="Times New Roman" panose="02020603050405020304" pitchFamily="18" charset="0"/>
+              </a:rPr>
+              <a:t>     </a:t>
+            </a:r>
+            <a:r>
+              <a:rPr lang="en-US" sz="1400" dirty="0" smtClean="0">
+                <a:latin typeface="Times New Roman" panose="02020603050405020304" pitchFamily="18" charset="0"/>
+                <a:cs typeface="Times New Roman" panose="02020603050405020304" pitchFamily="18" charset="0"/>
+              </a:rPr>
+              <a:t>&lt;/request&gt;</a:t>
+            </a:r>
+            <a:endParaRPr lang="en-US" sz="1400" dirty="0">
+              <a:latin typeface="Times New Roman" panose="02020603050405020304" pitchFamily="18" charset="0"/>
+              <a:cs typeface="Times New Roman" panose="02020603050405020304" pitchFamily="18" charset="0"/>
+            </a:endParaRPr>
+          </a:p>
+          <a:p>
+            <a:r>
+              <a:rPr lang="en-US" sz="1400" dirty="0">
+                <a:latin typeface="Times New Roman" panose="02020603050405020304" pitchFamily="18" charset="0"/>
+                <a:cs typeface="Times New Roman" panose="02020603050405020304" pitchFamily="18" charset="0"/>
+              </a:rPr>
+              <a:t>&lt;/model</a:t>
+            </a:r>
+            <a:r>
+              <a:rPr lang="en-US" sz="1400" dirty="0" smtClean="0">
+                <a:latin typeface="Times New Roman" panose="02020603050405020304" pitchFamily="18" charset="0"/>
+                <a:cs typeface="Times New Roman" panose="02020603050405020304" pitchFamily="18" charset="0"/>
+              </a:rPr>
+              <a:t>&gt;</a:t>
+            </a:r>
+            <a:endParaRPr lang="en-US" sz="1400" dirty="0">
+              <a:latin typeface="Times New Roman" panose="02020603050405020304" pitchFamily="18" charset="0"/>
+              <a:cs typeface="Times New Roman" panose="02020603050405020304" pitchFamily="18" charset="0"/>
+            </a:endParaRPr>
+          </a:p>
+        </p:txBody>
+      </p:sp>
+      <p:sp>
+        <p:nvSpPr>
+          <p:cNvPr id="37" name="TextBox 36"/>
+          <p:cNvSpPr txBox="1"/>
+          <p:nvPr/>
+        </p:nvSpPr>
+        <p:spPr>
+          <a:xfrm>
+            <a:off x="4272097" y="5127785"/>
+            <a:ext cx="1770613" cy="369332"/>
+          </a:xfrm>
+          <a:prstGeom prst="rect">
+            <a:avLst/>
+          </a:prstGeom>
+          <a:noFill/>
           <a:ln>
             <a:solidFill>
-              <a:schemeClr val="bg1">
-                <a:lumMod val="65000"/>
-              </a:schemeClr>
+              <a:schemeClr val="accent1"/>
             </a:solidFill>
           </a:ln>
         </p:spPr>
         <p:txBody>
-          <a:bodyPr wrap="square" rtlCol="0" anchor="ctr" anchorCtr="1">
+          <a:bodyPr wrap="none" rtlCol="0">
             <a:spAutoFit/>
           </a:bodyPr>
           <a:lstStyle/>
           <a:p>
             <a:pPr algn="ctr"/>
             <a:r>
+              <a:rPr lang="en-US" dirty="0"/>
+              <a:t>i</a:t>
+            </a:r>
+            <a:r>
               <a:rPr lang="en-US" dirty="0" smtClean="0"/>
-              <a:t>Alert Model Format</a:t>
-            </a:r>
-          </a:p>
-          <a:p>
-            <a:r>
-              <a:rPr lang="en-US" dirty="0" smtClean="0"/>
-              <a:t>&lt;model name=  timestamp= &gt;</a:t>
-            </a:r>
-          </a:p>
-          <a:p>
-            <a:r>
-              <a:rPr lang="en-US" dirty="0"/>
-              <a:t> </a:t>
-            </a:r>
-            <a:r>
-              <a:rPr lang="en-US" dirty="0" smtClean="0"/>
-              <a:t>   &lt;</a:t>
-            </a:r>
-            <a:r>
-              <a:rPr lang="en-US" dirty="0" err="1" smtClean="0"/>
-              <a:t>url</a:t>
-            </a:r>
-            <a:r>
-              <a:rPr lang="en-US" dirty="0" smtClean="0"/>
-              <a:t>&gt;</a:t>
-            </a:r>
-          </a:p>
-          <a:p>
-            <a:r>
-              <a:rPr lang="en-US" dirty="0" smtClean="0"/>
-              <a:t>        &lt;path&gt; &lt;/path&gt;</a:t>
-            </a:r>
-          </a:p>
-          <a:p>
-            <a:r>
-              <a:rPr lang="en-US" dirty="0" smtClean="0"/>
-              <a:t>        &lt;</a:t>
-            </a:r>
-            <a:r>
-              <a:rPr lang="en-US" dirty="0" err="1" smtClean="0"/>
-              <a:t>params</a:t>
-            </a:r>
-            <a:r>
-              <a:rPr lang="en-US" dirty="0" smtClean="0"/>
-              <a:t> first-seen= last-seen&gt;</a:t>
-            </a:r>
-          </a:p>
-          <a:p>
-            <a:r>
-              <a:rPr lang="en-US" dirty="0"/>
-              <a:t>	</a:t>
-            </a:r>
-            <a:r>
-              <a:rPr lang="en-US" dirty="0" smtClean="0"/>
-              <a:t>param-name-1, …, </a:t>
-            </a:r>
-            <a:r>
-              <a:rPr lang="en-US" dirty="0" err="1" smtClean="0"/>
-              <a:t>param</a:t>
-            </a:r>
-            <a:r>
-              <a:rPr lang="en-US" dirty="0" smtClean="0"/>
-              <a:t>-name-n</a:t>
-            </a:r>
-          </a:p>
-          <a:p>
-            <a:r>
-              <a:rPr lang="en-US" dirty="0" smtClean="0"/>
-              <a:t>         &lt;/</a:t>
-            </a:r>
-            <a:r>
-              <a:rPr lang="en-US" dirty="0" err="1" smtClean="0"/>
-              <a:t>params</a:t>
-            </a:r>
-            <a:r>
-              <a:rPr lang="en-US" dirty="0" smtClean="0"/>
-              <a:t>&gt;</a:t>
-            </a:r>
-          </a:p>
-          <a:p>
-            <a:r>
-              <a:rPr lang="en-US" dirty="0" smtClean="0"/>
-              <a:t>     &lt;/</a:t>
-            </a:r>
-            <a:r>
-              <a:rPr lang="en-US" dirty="0" err="1" smtClean="0"/>
-              <a:t>url</a:t>
-            </a:r>
-            <a:r>
-              <a:rPr lang="en-US" dirty="0" smtClean="0"/>
-              <a:t>&gt;</a:t>
-            </a:r>
-          </a:p>
-          <a:p>
-            <a:r>
-              <a:rPr lang="en-US" dirty="0" smtClean="0"/>
-              <a:t>&lt;/model&gt;</a:t>
-            </a:r>
-          </a:p>
-          <a:p>
+              <a:t>nsecure method</a:t>
+            </a:r>
             <a:endParaRPr lang="en-US" dirty="0"/>
           </a:p>
         </p:txBody>
@@ -7701,7 +8109,7 @@
   <a:extraClrSchemeLst/>
   <a:extLst>
     <a:ext uri="{05A4C25C-085E-4340-85A3-A5531E510DB2}">
-      <thm15:themeFamily xmlns:thm15="http://schemas.microsoft.com/office/thememl/2012/main" xmlns="" name="Office Theme" id="{62F939B6-93AF-4DB8-9C6B-D6C7DFDC589F}" vid="{4A3C46E8-61CC-4603-A589-7422A47A8E4A}"/>
+      <thm15:themeFamily xmlns="" xmlns:thm15="http://schemas.microsoft.com/office/thememl/2012/main" name="Office Theme" id="{62F939B6-93AF-4DB8-9C6B-D6C7DFDC589F}" vid="{4A3C46E8-61CC-4603-A589-7422A47A8E4A}"/>
     </a:ext>
   </a:extLst>
 </a:theme>

</xml_diff>

<commit_message>
detect sensitive param, insecure method.
</commit_message>
<xml_diff>
--- a/doc/sharp-design-doc.pptx
+++ b/doc/sharp-design-doc.pptx
@@ -109,7 +109,7 @@
   </p:defaultTextStyle>
   <p:extLst>
     <p:ext uri="{EFAFB233-063F-42B5-8137-9DF3F51BA10A}">
-      <p15:sldGuideLst xmlns="" xmlns:p15="http://schemas.microsoft.com/office/powerpoint/2012/main"/>
+      <p15:sldGuideLst xmlns:p15="http://schemas.microsoft.com/office/powerpoint/2012/main" xmlns=""/>
     </p:ext>
   </p:extLst>
 </p:presentation>
@@ -246,7 +246,7 @@
           <a:p>
             <a:fld id="{59AAB081-3BCA-4894-8A8D-477C7967B98C}" type="datetimeFigureOut">
               <a:rPr lang="en-US" smtClean="0"/>
-              <a:t>3/3/2015</a:t>
+              <a:t>3/4/2015</a:t>
             </a:fld>
             <a:endParaRPr lang="en-US"/>
           </a:p>
@@ -416,7 +416,7 @@
           <a:p>
             <a:fld id="{59AAB081-3BCA-4894-8A8D-477C7967B98C}" type="datetimeFigureOut">
               <a:rPr lang="en-US" smtClean="0"/>
-              <a:t>3/3/2015</a:t>
+              <a:t>3/4/2015</a:t>
             </a:fld>
             <a:endParaRPr lang="en-US"/>
           </a:p>
@@ -596,7 +596,7 @@
           <a:p>
             <a:fld id="{59AAB081-3BCA-4894-8A8D-477C7967B98C}" type="datetimeFigureOut">
               <a:rPr lang="en-US" smtClean="0"/>
-              <a:t>3/3/2015</a:t>
+              <a:t>3/4/2015</a:t>
             </a:fld>
             <a:endParaRPr lang="en-US"/>
           </a:p>
@@ -766,7 +766,7 @@
           <a:p>
             <a:fld id="{59AAB081-3BCA-4894-8A8D-477C7967B98C}" type="datetimeFigureOut">
               <a:rPr lang="en-US" smtClean="0"/>
-              <a:t>3/3/2015</a:t>
+              <a:t>3/4/2015</a:t>
             </a:fld>
             <a:endParaRPr lang="en-US"/>
           </a:p>
@@ -1012,7 +1012,7 @@
           <a:p>
             <a:fld id="{59AAB081-3BCA-4894-8A8D-477C7967B98C}" type="datetimeFigureOut">
               <a:rPr lang="en-US" smtClean="0"/>
-              <a:t>3/3/2015</a:t>
+              <a:t>3/4/2015</a:t>
             </a:fld>
             <a:endParaRPr lang="en-US"/>
           </a:p>
@@ -1244,7 +1244,7 @@
           <a:p>
             <a:fld id="{59AAB081-3BCA-4894-8A8D-477C7967B98C}" type="datetimeFigureOut">
               <a:rPr lang="en-US" smtClean="0"/>
-              <a:t>3/3/2015</a:t>
+              <a:t>3/4/2015</a:t>
             </a:fld>
             <a:endParaRPr lang="en-US"/>
           </a:p>
@@ -1611,7 +1611,7 @@
           <a:p>
             <a:fld id="{59AAB081-3BCA-4894-8A8D-477C7967B98C}" type="datetimeFigureOut">
               <a:rPr lang="en-US" smtClean="0"/>
-              <a:t>3/3/2015</a:t>
+              <a:t>3/4/2015</a:t>
             </a:fld>
             <a:endParaRPr lang="en-US"/>
           </a:p>
@@ -1729,7 +1729,7 @@
           <a:p>
             <a:fld id="{59AAB081-3BCA-4894-8A8D-477C7967B98C}" type="datetimeFigureOut">
               <a:rPr lang="en-US" smtClean="0"/>
-              <a:t>3/3/2015</a:t>
+              <a:t>3/4/2015</a:t>
             </a:fld>
             <a:endParaRPr lang="en-US"/>
           </a:p>
@@ -1824,7 +1824,7 @@
           <a:p>
             <a:fld id="{59AAB081-3BCA-4894-8A8D-477C7967B98C}" type="datetimeFigureOut">
               <a:rPr lang="en-US" smtClean="0"/>
-              <a:t>3/3/2015</a:t>
+              <a:t>3/4/2015</a:t>
             </a:fld>
             <a:endParaRPr lang="en-US"/>
           </a:p>
@@ -2101,7 +2101,7 @@
           <a:p>
             <a:fld id="{59AAB081-3BCA-4894-8A8D-477C7967B98C}" type="datetimeFigureOut">
               <a:rPr lang="en-US" smtClean="0"/>
-              <a:t>3/3/2015</a:t>
+              <a:t>3/4/2015</a:t>
             </a:fld>
             <a:endParaRPr lang="en-US"/>
           </a:p>
@@ -2354,7 +2354,7 @@
           <a:p>
             <a:fld id="{59AAB081-3BCA-4894-8A8D-477C7967B98C}" type="datetimeFigureOut">
               <a:rPr lang="en-US" smtClean="0"/>
-              <a:t>3/3/2015</a:t>
+              <a:t>3/4/2015</a:t>
             </a:fld>
             <a:endParaRPr lang="en-US"/>
           </a:p>
@@ -2567,7 +2567,7 @@
           <a:p>
             <a:fld id="{59AAB081-3BCA-4894-8A8D-477C7967B98C}" type="datetimeFigureOut">
               <a:rPr lang="en-US" smtClean="0"/>
-              <a:t>3/3/2015</a:t>
+              <a:t>3/4/2015</a:t>
             </a:fld>
             <a:endParaRPr lang="en-US"/>
           </a:p>
@@ -5558,11 +5558,7 @@
             <a:pPr algn="ctr"/>
             <a:r>
               <a:rPr lang="en-US" sz="2800" dirty="0" smtClean="0"/>
-              <a:t>Web URL </a:t>
-            </a:r>
-            <a:r>
-              <a:rPr lang="en-US" sz="2800" dirty="0" smtClean="0"/>
-              <a:t>Alert Detection Model</a:t>
+              <a:t>Web URL Alert Detection Model</a:t>
             </a:r>
             <a:endParaRPr lang="en-US" sz="2800" dirty="0"/>
           </a:p>
@@ -6239,11 +6235,7 @@
             </a:r>
             <a:r>
               <a:rPr lang="en-US" dirty="0" smtClean="0"/>
-              <a:t> </a:t>
-            </a:r>
-            <a:r>
-              <a:rPr lang="en-US" dirty="0" smtClean="0"/>
-              <a:t>name</a:t>
+              <a:t> name</a:t>
             </a:r>
             <a:endParaRPr lang="en-US" dirty="0"/>
           </a:p>
@@ -6279,11 +6271,7 @@
             <a:pPr algn="ctr"/>
             <a:r>
               <a:rPr lang="en-US" dirty="0" smtClean="0"/>
-              <a:t>new </a:t>
-            </a:r>
-            <a:r>
-              <a:rPr lang="en-US" dirty="0" smtClean="0"/>
-              <a:t>URL</a:t>
+              <a:t>new URL</a:t>
             </a:r>
             <a:endParaRPr lang="en-US" dirty="0"/>
           </a:p>
@@ -6550,8 +6538,8 @@
         </p:nvSpPr>
         <p:spPr>
           <a:xfrm>
-            <a:off x="7341335" y="3502652"/>
-            <a:ext cx="3775156" cy="1877437"/>
+            <a:off x="7249886" y="3502652"/>
+            <a:ext cx="4689565" cy="1661993"/>
           </a:xfrm>
           <a:prstGeom prst="rect">
             <a:avLst/>
@@ -6579,100 +6567,80 @@
             </a:r>
             <a:r>
               <a:rPr lang="en-US" dirty="0" smtClean="0"/>
-              <a:t> Format</a:t>
-            </a:r>
-            <a:endParaRPr lang="en-US" dirty="0"/>
-          </a:p>
-          <a:p>
-            <a:r>
-              <a:rPr lang="en-US" sz="1400" dirty="0">
-                <a:latin typeface="Times New Roman" panose="02020603050405020304" pitchFamily="18" charset="0"/>
-                <a:cs typeface="Times New Roman" panose="02020603050405020304" pitchFamily="18" charset="0"/>
-              </a:rPr>
+              <a:t> </a:t>
+            </a:r>
+            <a:r>
+              <a:rPr lang="en-US" dirty="0" smtClean="0"/>
+              <a:t>Format</a:t>
+            </a:r>
+          </a:p>
+          <a:p>
+            <a:r>
+              <a:rPr lang="en-US" sz="1400" dirty="0" smtClean="0"/>
               <a:t>&lt;</a:t>
             </a:r>
             <a:r>
-              <a:rPr lang="en-US" sz="1400" dirty="0" err="1">
-                <a:latin typeface="Times New Roman" panose="02020603050405020304" pitchFamily="18" charset="0"/>
-                <a:cs typeface="Times New Roman" panose="02020603050405020304" pitchFamily="18" charset="0"/>
-              </a:rPr>
+              <a:rPr lang="en-US" sz="1400" dirty="0" err="1" smtClean="0"/>
               <a:t>conf</a:t>
             </a:r>
             <a:r>
-              <a:rPr lang="en-US" sz="1400" dirty="0">
-                <a:latin typeface="Times New Roman" panose="02020603050405020304" pitchFamily="18" charset="0"/>
-                <a:cs typeface="Times New Roman" panose="02020603050405020304" pitchFamily="18" charset="0"/>
-              </a:rPr>
+              <a:rPr lang="en-US" sz="1400" dirty="0" smtClean="0"/>
               <a:t>&gt;</a:t>
             </a:r>
           </a:p>
           <a:p>
             <a:r>
-              <a:rPr lang="en-US" sz="1400" dirty="0">
-                <a:latin typeface="Times New Roman" panose="02020603050405020304" pitchFamily="18" charset="0"/>
-                <a:cs typeface="Times New Roman" panose="02020603050405020304" pitchFamily="18" charset="0"/>
-              </a:rPr>
-              <a:t>    &lt;model-name&gt;  (unique)</a:t>
-            </a:r>
-          </a:p>
-          <a:p>
-            <a:r>
-              <a:rPr lang="en-US" sz="1400" dirty="0">
-                <a:latin typeface="Times New Roman" panose="02020603050405020304" pitchFamily="18" charset="0"/>
-                <a:cs typeface="Times New Roman" panose="02020603050405020304" pitchFamily="18" charset="0"/>
-              </a:rPr>
-              <a:t>    &lt;model-location&gt; </a:t>
-            </a:r>
-          </a:p>
-          <a:p>
-            <a:r>
-              <a:rPr lang="en-US" sz="1400" dirty="0">
-                <a:latin typeface="Times New Roman" panose="02020603050405020304" pitchFamily="18" charset="0"/>
-                <a:cs typeface="Times New Roman" panose="02020603050405020304" pitchFamily="18" charset="0"/>
-              </a:rPr>
-              <a:t>    &lt;model-description&gt; (optional)</a:t>
-            </a:r>
-          </a:p>
-          <a:p>
-            <a:r>
-              <a:rPr lang="en-US" sz="1400" dirty="0">
-                <a:latin typeface="Times New Roman" panose="02020603050405020304" pitchFamily="18" charset="0"/>
-                <a:cs typeface="Times New Roman" panose="02020603050405020304" pitchFamily="18" charset="0"/>
-              </a:rPr>
-              <a:t>    &lt;log-type&gt;</a:t>
-            </a:r>
-          </a:p>
-          <a:p>
-            <a:r>
-              <a:rPr lang="en-US" sz="1400" dirty="0">
-                <a:latin typeface="Times New Roman" panose="02020603050405020304" pitchFamily="18" charset="0"/>
-                <a:cs typeface="Times New Roman" panose="02020603050405020304" pitchFamily="18" charset="0"/>
-              </a:rPr>
-              <a:t>    &lt;log-location&gt;   </a:t>
-            </a:r>
-          </a:p>
-          <a:p>
-            <a:r>
-              <a:rPr lang="en-US" sz="1400" dirty="0">
-                <a:latin typeface="Times New Roman" panose="02020603050405020304" pitchFamily="18" charset="0"/>
-                <a:cs typeface="Times New Roman" panose="02020603050405020304" pitchFamily="18" charset="0"/>
-              </a:rPr>
+              <a:rPr lang="en-US" sz="1400" dirty="0" smtClean="0"/>
+              <a:t>    </a:t>
+            </a:r>
+            <a:r>
+              <a:rPr lang="en-US" sz="1400" dirty="0"/>
+              <a:t>&lt;model-name&gt;test-model&lt;/model-name&gt;</a:t>
+            </a:r>
+          </a:p>
+          <a:p>
+            <a:r>
+              <a:rPr lang="en-US" sz="1400" dirty="0"/>
+              <a:t>    &lt;model-description&gt;some </a:t>
+            </a:r>
+            <a:r>
+              <a:rPr lang="en-US" sz="1400" dirty="0" smtClean="0"/>
+              <a:t>description&lt;/model-description</a:t>
+            </a:r>
+            <a:r>
+              <a:rPr lang="en-US" sz="1400" dirty="0"/>
+              <a:t>&gt;</a:t>
+            </a:r>
+          </a:p>
+          <a:p>
+            <a:r>
+              <a:rPr lang="en-US" sz="1400" dirty="0"/>
+              <a:t>    &lt;log-type&gt;web access log&lt;/log-type&gt;</a:t>
+            </a:r>
+          </a:p>
+          <a:p>
+            <a:r>
+              <a:rPr lang="en-US" sz="1400" dirty="0"/>
+              <a:t>    &lt;log-file&gt;weblog-entries.txt&lt;/log-file&gt;   </a:t>
+            </a:r>
+          </a:p>
+          <a:p>
+            <a:r>
+              <a:rPr lang="en-US" sz="1400" dirty="0"/>
               <a:t>&lt;/</a:t>
             </a:r>
             <a:r>
-              <a:rPr lang="en-US" sz="1400" dirty="0" err="1">
-                <a:latin typeface="Times New Roman" panose="02020603050405020304" pitchFamily="18" charset="0"/>
-                <a:cs typeface="Times New Roman" panose="02020603050405020304" pitchFamily="18" charset="0"/>
-              </a:rPr>
+              <a:rPr lang="en-US" sz="1400" dirty="0" err="1"/>
               <a:t>conf</a:t>
             </a:r>
             <a:r>
-              <a:rPr lang="en-US" sz="1400" dirty="0">
-                <a:latin typeface="Times New Roman" panose="02020603050405020304" pitchFamily="18" charset="0"/>
-                <a:cs typeface="Times New Roman" panose="02020603050405020304" pitchFamily="18" charset="0"/>
-              </a:rPr>
+              <a:rPr lang="en-US" sz="1400" dirty="0"/>
               <a:t>&gt;</a:t>
             </a:r>
+            <a:endParaRPr lang="en-US" sz="1400" dirty="0">
+              <a:latin typeface="Times New Roman" panose="02020603050405020304" pitchFamily="18" charset="0"/>
+              <a:cs typeface="Times New Roman" panose="02020603050405020304" pitchFamily="18" charset="0"/>
+            </a:endParaRPr>
           </a:p>
         </p:txBody>
       </p:sp>
@@ -6684,8 +6652,8 @@
         </p:nvSpPr>
         <p:spPr>
           <a:xfrm>
-            <a:off x="7341335" y="1156289"/>
-            <a:ext cx="3775156" cy="2308324"/>
+            <a:off x="7249893" y="1156289"/>
+            <a:ext cx="4689557" cy="2308324"/>
           </a:xfrm>
           <a:prstGeom prst="rect">
             <a:avLst/>
@@ -6750,21 +6718,7 @@
                 <a:latin typeface="Times New Roman" panose="02020603050405020304" pitchFamily="18" charset="0"/>
                 <a:cs typeface="Times New Roman" panose="02020603050405020304" pitchFamily="18" charset="0"/>
               </a:rPr>
-              <a:t>&lt;</a:t>
-            </a:r>
-            <a:r>
-              <a:rPr lang="en-US" sz="1400" dirty="0" smtClean="0">
-                <a:latin typeface="Times New Roman" panose="02020603050405020304" pitchFamily="18" charset="0"/>
-                <a:cs typeface="Times New Roman" panose="02020603050405020304" pitchFamily="18" charset="0"/>
-              </a:rPr>
-              <a:t>request</a:t>
-            </a:r>
-            <a:r>
-              <a:rPr lang="en-US" sz="1400" dirty="0" smtClean="0">
-                <a:latin typeface="Times New Roman" panose="02020603050405020304" pitchFamily="18" charset="0"/>
-                <a:cs typeface="Times New Roman" panose="02020603050405020304" pitchFamily="18" charset="0"/>
-              </a:rPr>
-              <a:t>&gt;</a:t>
+              <a:t>&lt;request&gt;</a:t>
             </a:r>
           </a:p>
           <a:p>
@@ -8109,7 +8063,7 @@
   <a:extraClrSchemeLst/>
   <a:extLst>
     <a:ext uri="{05A4C25C-085E-4340-85A3-A5531E510DB2}">
-      <thm15:themeFamily xmlns="" xmlns:thm15="http://schemas.microsoft.com/office/thememl/2012/main" name="Office Theme" id="{62F939B6-93AF-4DB8-9C6B-D6C7DFDC589F}" vid="{4A3C46E8-61CC-4603-A589-7422A47A8E4A}"/>
+      <thm15:themeFamily xmlns:thm15="http://schemas.microsoft.com/office/thememl/2012/main" xmlns="" name="Office Theme" id="{62F939B6-93AF-4DB8-9C6B-D6C7DFDC589F}" vid="{4A3C46E8-61CC-4603-A589-7422A47A8E4A}"/>
     </a:ext>
   </a:extLst>
 </a:theme>

</xml_diff>